<commit_message>
Update Design Section for DeveloperGuide
</commit_message>
<xml_diff>
--- a/docs/diagrams/DeleteInvestigatorSequenceDiagram.pptx
+++ b/docs/diagrams/DeleteInvestigatorSequenceDiagram.pptx
@@ -3790,8 +3790,8 @@
         </p:nvSpPr>
         <p:spPr>
           <a:xfrm>
-            <a:off x="0" y="237640"/>
-            <a:ext cx="9609118" cy="4343400"/>
+            <a:off x="0" y="237639"/>
+            <a:ext cx="8534400" cy="4791559"/>
           </a:xfrm>
           <a:prstGeom prst="roundRect">
             <a:avLst>
@@ -3925,7 +3925,7 @@
         <p:spPr>
           <a:xfrm>
             <a:off x="1610959" y="907617"/>
-            <a:ext cx="0" cy="3481399"/>
+            <a:ext cx="0" cy="3816783"/>
           </a:xfrm>
           <a:prstGeom prst="line">
             <a:avLst/>
@@ -3962,7 +3962,7 @@
         <p:spPr>
           <a:xfrm>
             <a:off x="1538951" y="1258311"/>
-            <a:ext cx="152400" cy="2932689"/>
+            <a:ext cx="135074" cy="3229994"/>
           </a:xfrm>
           <a:prstGeom prst="rect">
             <a:avLst/>
@@ -4052,12 +4052,12 @@
           <a:p>
             <a:pPr algn="ctr"/>
             <a:r>
-              <a:rPr lang="en-US" sz="1600" dirty="0" err="1">
+              <a:rPr lang="en-US" sz="1600" dirty="0">
                 <a:solidFill>
                   <a:schemeClr val="bg1"/>
                 </a:solidFill>
               </a:rPr>
-              <a:t>Investigapptor</a:t>
+              <a:t>i:Investigapptor</a:t>
             </a:r>
             <a:endParaRPr lang="en-SG" sz="1600" dirty="0">
               <a:solidFill>
@@ -4288,7 +4288,7 @@
         </p:nvCxnSpPr>
         <p:spPr>
           <a:xfrm>
-            <a:off x="4105358" y="3783588"/>
+            <a:off x="3415803" y="3765078"/>
             <a:ext cx="4013890" cy="7488"/>
           </a:xfrm>
           <a:prstGeom prst="straightConnector1">
@@ -4626,7 +4626,7 @@
         </p:nvCxnSpPr>
         <p:spPr>
           <a:xfrm>
-            <a:off x="8125310" y="893747"/>
+            <a:off x="7435755" y="875237"/>
             <a:ext cx="0" cy="3494826"/>
           </a:xfrm>
           <a:prstGeom prst="line">
@@ -4666,7 +4666,7 @@
         <p:spPr>
           <a:xfrm>
             <a:off x="4095543" y="3535790"/>
-            <a:ext cx="3965339" cy="0"/>
+            <a:ext cx="3275785" cy="0"/>
           </a:xfrm>
           <a:prstGeom prst="straightConnector1">
             <a:avLst/>
@@ -4951,7 +4951,7 @@
         </p:nvSpPr>
         <p:spPr>
           <a:xfrm>
-            <a:off x="6486053" y="3298771"/>
+            <a:off x="6324694" y="3307398"/>
             <a:ext cx="1133945" cy="184666"/>
           </a:xfrm>
           <a:prstGeom prst="rect">
@@ -5654,7 +5654,7 @@
         </p:nvSpPr>
         <p:spPr>
           <a:xfrm>
-            <a:off x="6741883" y="431280"/>
+            <a:off x="6052328" y="412770"/>
             <a:ext cx="2402117" cy="461538"/>
           </a:xfrm>
           <a:prstGeom prst="rect">
@@ -5723,8 +5723,8 @@
         </p:nvSpPr>
         <p:spPr>
           <a:xfrm>
-            <a:off x="8060883" y="3503066"/>
-            <a:ext cx="116730" cy="288010"/>
+            <a:off x="7371328" y="3535790"/>
+            <a:ext cx="116730" cy="236776"/>
           </a:xfrm>
           <a:prstGeom prst="rect">
             <a:avLst/>
@@ -5782,8 +5782,8 @@
         </p:nvCxnSpPr>
         <p:spPr>
           <a:xfrm>
-            <a:off x="-152400" y="4197669"/>
-            <a:ext cx="1660871" cy="0"/>
+            <a:off x="-228600" y="4488219"/>
+            <a:ext cx="1767551" cy="0"/>
           </a:xfrm>
           <a:prstGeom prst="straightConnector1">
             <a:avLst/>
@@ -5812,6 +5812,367 @@
           </a:fontRef>
         </p:style>
       </p:cxnSp>
+      <p:sp>
+        <p:nvSpPr>
+          <p:cNvPr id="47" name="Rectangle 62">
+            <a:extLst>
+              <a:ext uri="{FF2B5EF4-FFF2-40B4-BE49-F238E27FC236}">
+                <a16:creationId xmlns:a16="http://schemas.microsoft.com/office/drawing/2014/main" id="{00830E11-290B-41F6-A0DB-1EE281781519}"/>
+              </a:ext>
+            </a:extLst>
+          </p:cNvPr>
+          <p:cNvSpPr/>
+          <p:nvPr/>
+        </p:nvSpPr>
+        <p:spPr>
+          <a:xfrm>
+            <a:off x="8715839" y="412770"/>
+            <a:ext cx="1670495" cy="461538"/>
+          </a:xfrm>
+          <a:prstGeom prst="rect">
+            <a:avLst/>
+          </a:prstGeom>
+          <a:solidFill>
+            <a:schemeClr val="accent1">
+              <a:lumMod val="60000"/>
+              <a:lumOff val="40000"/>
+            </a:schemeClr>
+          </a:solidFill>
+          <a:ln w="19050">
+            <a:noFill/>
+          </a:ln>
+          <a:effectLst/>
+        </p:spPr>
+        <p:style>
+          <a:lnRef idx="1">
+            <a:schemeClr val="accent2"/>
+          </a:lnRef>
+          <a:fillRef idx="2">
+            <a:schemeClr val="accent2"/>
+          </a:fillRef>
+          <a:effectRef idx="1">
+            <a:schemeClr val="accent2"/>
+          </a:effectRef>
+          <a:fontRef idx="minor">
+            <a:schemeClr val="dk1"/>
+          </a:fontRef>
+        </p:style>
+        <p:txBody>
+          <a:bodyPr rtlCol="0" anchor="ctr"/>
+          <a:lstStyle/>
+          <a:p>
+            <a:pPr algn="ctr"/>
+            <a:r>
+              <a:rPr lang="en-US" sz="1600" dirty="0">
+                <a:solidFill>
+                  <a:schemeClr val="bg1"/>
+                </a:solidFill>
+              </a:rPr>
+              <a:t>:</a:t>
+            </a:r>
+            <a:r>
+              <a:rPr lang="en-US" sz="1600" dirty="0" err="1">
+                <a:solidFill>
+                  <a:schemeClr val="bg1"/>
+                </a:solidFill>
+              </a:rPr>
+              <a:t>EventsCenter</a:t>
+            </a:r>
+            <a:endParaRPr lang="en-SG" sz="1600" dirty="0">
+              <a:solidFill>
+                <a:schemeClr val="bg1"/>
+              </a:solidFill>
+            </a:endParaRPr>
+          </a:p>
+        </p:txBody>
+      </p:sp>
+      <p:cxnSp>
+        <p:nvCxnSpPr>
+          <p:cNvPr id="48" name="Straight Connector 47">
+            <a:extLst>
+              <a:ext uri="{FF2B5EF4-FFF2-40B4-BE49-F238E27FC236}">
+                <a16:creationId xmlns:a16="http://schemas.microsoft.com/office/drawing/2014/main" id="{170B5DFD-4F21-4903-9132-7092F8E6310A}"/>
+              </a:ext>
+            </a:extLst>
+          </p:cNvPr>
+          <p:cNvCxnSpPr>
+            <a:cxnSpLocks/>
+          </p:cNvCxnSpPr>
+          <p:nvPr/>
+        </p:nvCxnSpPr>
+        <p:spPr>
+          <a:xfrm>
+            <a:off x="9474120" y="856074"/>
+            <a:ext cx="17747" cy="4653719"/>
+          </a:xfrm>
+          <a:prstGeom prst="line">
+            <a:avLst/>
+          </a:prstGeom>
+          <a:ln w="19050">
+            <a:solidFill>
+              <a:schemeClr val="tx2">
+                <a:lumMod val="60000"/>
+                <a:lumOff val="40000"/>
+              </a:schemeClr>
+            </a:solidFill>
+            <a:prstDash val="sysDash"/>
+          </a:ln>
+          <a:effectLst/>
+        </p:spPr>
+        <p:style>
+          <a:lnRef idx="1">
+            <a:schemeClr val="accent1"/>
+          </a:lnRef>
+          <a:fillRef idx="2">
+            <a:schemeClr val="accent1"/>
+          </a:fillRef>
+          <a:effectRef idx="1">
+            <a:schemeClr val="accent1"/>
+          </a:effectRef>
+          <a:fontRef idx="minor">
+            <a:schemeClr val="dk1"/>
+          </a:fontRef>
+        </p:style>
+      </p:cxnSp>
+      <p:sp>
+        <p:nvSpPr>
+          <p:cNvPr id="51" name="Rectangle 50">
+            <a:extLst>
+              <a:ext uri="{FF2B5EF4-FFF2-40B4-BE49-F238E27FC236}">
+                <a16:creationId xmlns:a16="http://schemas.microsoft.com/office/drawing/2014/main" id="{AE19A358-9ACB-443A-8C44-1FE373BD5F87}"/>
+              </a:ext>
+            </a:extLst>
+          </p:cNvPr>
+          <p:cNvSpPr/>
+          <p:nvPr/>
+        </p:nvSpPr>
+        <p:spPr>
+          <a:xfrm>
+            <a:off x="9408478" y="4143839"/>
+            <a:ext cx="166778" cy="285436"/>
+          </a:xfrm>
+          <a:prstGeom prst="rect">
+            <a:avLst/>
+          </a:prstGeom>
+          <a:solidFill>
+            <a:schemeClr val="accent1">
+              <a:lumMod val="60000"/>
+              <a:lumOff val="40000"/>
+            </a:schemeClr>
+          </a:solidFill>
+          <a:ln>
+            <a:noFill/>
+          </a:ln>
+          <a:effectLst/>
+        </p:spPr>
+        <p:style>
+          <a:lnRef idx="1">
+            <a:schemeClr val="accent3"/>
+          </a:lnRef>
+          <a:fillRef idx="2">
+            <a:schemeClr val="accent3"/>
+          </a:fillRef>
+          <a:effectRef idx="1">
+            <a:schemeClr val="accent3"/>
+          </a:effectRef>
+          <a:fontRef idx="minor">
+            <a:schemeClr val="dk1"/>
+          </a:fontRef>
+        </p:style>
+        <p:txBody>
+          <a:bodyPr rtlCol="0" anchor="ctr"/>
+          <a:lstStyle/>
+          <a:p>
+            <a:pPr algn="ctr"/>
+            <a:endParaRPr lang="en-SG" sz="1400"/>
+          </a:p>
+        </p:txBody>
+      </p:sp>
+      <p:cxnSp>
+        <p:nvCxnSpPr>
+          <p:cNvPr id="52" name="Straight Arrow Connector 51">
+            <a:extLst>
+              <a:ext uri="{FF2B5EF4-FFF2-40B4-BE49-F238E27FC236}">
+                <a16:creationId xmlns:a16="http://schemas.microsoft.com/office/drawing/2014/main" id="{02742F1C-9F39-48BB-9B6D-0A7449BF7DA3}"/>
+              </a:ext>
+            </a:extLst>
+          </p:cNvPr>
+          <p:cNvCxnSpPr>
+            <a:cxnSpLocks/>
+          </p:cNvCxnSpPr>
+          <p:nvPr/>
+        </p:nvCxnSpPr>
+        <p:spPr>
+          <a:xfrm>
+            <a:off x="1674025" y="4146880"/>
+            <a:ext cx="7716706" cy="3688"/>
+          </a:xfrm>
+          <a:prstGeom prst="straightConnector1">
+            <a:avLst/>
+          </a:prstGeom>
+          <a:ln w="19050">
+            <a:solidFill>
+              <a:srgbClr val="0070C0"/>
+            </a:solidFill>
+            <a:tailEnd type="arrow"/>
+          </a:ln>
+        </p:spPr>
+        <p:style>
+          <a:lnRef idx="1">
+            <a:schemeClr val="accent1"/>
+          </a:lnRef>
+          <a:fillRef idx="0">
+            <a:schemeClr val="accent1"/>
+          </a:fillRef>
+          <a:effectRef idx="0">
+            <a:schemeClr val="accent1"/>
+          </a:effectRef>
+          <a:fontRef idx="minor">
+            <a:schemeClr val="tx1"/>
+          </a:fontRef>
+        </p:style>
+      </p:cxnSp>
+      <p:cxnSp>
+        <p:nvCxnSpPr>
+          <p:cNvPr id="55" name="Straight Arrow Connector 54">
+            <a:extLst>
+              <a:ext uri="{FF2B5EF4-FFF2-40B4-BE49-F238E27FC236}">
+                <a16:creationId xmlns:a16="http://schemas.microsoft.com/office/drawing/2014/main" id="{A0C170C8-4CF9-4A84-BA66-F9DE3E6A747B}"/>
+              </a:ext>
+            </a:extLst>
+          </p:cNvPr>
+          <p:cNvCxnSpPr>
+            <a:cxnSpLocks/>
+          </p:cNvCxnSpPr>
+          <p:nvPr/>
+        </p:nvCxnSpPr>
+        <p:spPr>
+          <a:xfrm>
+            <a:off x="1682968" y="4424011"/>
+            <a:ext cx="7725510" cy="0"/>
+          </a:xfrm>
+          <a:prstGeom prst="straightConnector1">
+            <a:avLst/>
+          </a:prstGeom>
+          <a:ln w="19050">
+            <a:solidFill>
+              <a:srgbClr val="0070C0"/>
+            </a:solidFill>
+            <a:prstDash val="sysDash"/>
+            <a:headEnd type="arrow" w="med" len="med"/>
+            <a:tailEnd type="none" w="med" len="med"/>
+          </a:ln>
+        </p:spPr>
+        <p:style>
+          <a:lnRef idx="1">
+            <a:schemeClr val="accent1"/>
+          </a:lnRef>
+          <a:fillRef idx="0">
+            <a:schemeClr val="accent1"/>
+          </a:fillRef>
+          <a:effectRef idx="0">
+            <a:schemeClr val="accent1"/>
+          </a:effectRef>
+          <a:fontRef idx="minor">
+            <a:schemeClr val="tx1"/>
+          </a:fontRef>
+        </p:style>
+      </p:cxnSp>
+      <p:sp>
+        <p:nvSpPr>
+          <p:cNvPr id="14" name="Rectangle 13">
+            <a:extLst>
+              <a:ext uri="{FF2B5EF4-FFF2-40B4-BE49-F238E27FC236}">
+                <a16:creationId xmlns:a16="http://schemas.microsoft.com/office/drawing/2014/main" id="{7496185E-2EC5-4053-A08A-E87953F1CEAB}"/>
+              </a:ext>
+            </a:extLst>
+          </p:cNvPr>
+          <p:cNvSpPr/>
+          <p:nvPr/>
+        </p:nvSpPr>
+        <p:spPr>
+          <a:xfrm>
+            <a:off x="7424120" y="3826514"/>
+            <a:ext cx="4572000" cy="276999"/>
+          </a:xfrm>
+          <a:prstGeom prst="rect">
+            <a:avLst/>
+          </a:prstGeom>
+        </p:spPr>
+        <p:txBody>
+          <a:bodyPr>
+            <a:spAutoFit/>
+          </a:bodyPr>
+          <a:lstStyle/>
+          <a:p>
+            <a:pPr lvl="0" eaLnBrk="0" fontAlgn="base" hangingPunct="0">
+              <a:spcBef>
+                <a:spcPct val="0"/>
+              </a:spcBef>
+              <a:spcAft>
+                <a:spcPct val="0"/>
+              </a:spcAft>
+            </a:pPr>
+            <a:r>
+              <a:rPr lang="en-US" altLang="en-US" sz="1200" dirty="0">
+                <a:solidFill>
+                  <a:srgbClr val="0070C0"/>
+                </a:solidFill>
+                <a:latin typeface="Calibri" panose="020F0502020204030204" pitchFamily="34" charset="0"/>
+                <a:cs typeface="Calibri" panose="020F0502020204030204" pitchFamily="34" charset="0"/>
+              </a:rPr>
+              <a:t>raise(new </a:t>
+            </a:r>
+            <a:r>
+              <a:rPr lang="en-US" altLang="en-US" sz="1200" dirty="0" err="1">
+                <a:solidFill>
+                  <a:srgbClr val="0070C0"/>
+                </a:solidFill>
+                <a:latin typeface="Calibri" panose="020F0502020204030204" pitchFamily="34" charset="0"/>
+                <a:cs typeface="Calibri" panose="020F0502020204030204" pitchFamily="34" charset="0"/>
+              </a:rPr>
+              <a:t>InvestigapptorChangedEvent</a:t>
+            </a:r>
+            <a:r>
+              <a:rPr lang="en-US" altLang="en-US" sz="1200" dirty="0">
+                <a:solidFill>
+                  <a:srgbClr val="0070C0"/>
+                </a:solidFill>
+                <a:latin typeface="Calibri" panose="020F0502020204030204" pitchFamily="34" charset="0"/>
+                <a:cs typeface="Calibri" panose="020F0502020204030204" pitchFamily="34" charset="0"/>
+              </a:rPr>
+              <a:t>(</a:t>
+            </a:r>
+            <a:r>
+              <a:rPr lang="en-US" altLang="en-US" sz="1200" dirty="0" err="1">
+                <a:solidFill>
+                  <a:srgbClr val="0070C0"/>
+                </a:solidFill>
+                <a:latin typeface="Calibri" panose="020F0502020204030204" pitchFamily="34" charset="0"/>
+                <a:cs typeface="Calibri" panose="020F0502020204030204" pitchFamily="34" charset="0"/>
+              </a:rPr>
+              <a:t>i</a:t>
+            </a:r>
+            <a:r>
+              <a:rPr lang="en-US" altLang="en-US" sz="1200" dirty="0">
+                <a:solidFill>
+                  <a:srgbClr val="0070C0"/>
+                </a:solidFill>
+                <a:latin typeface="Calibri" panose="020F0502020204030204" pitchFamily="34" charset="0"/>
+                <a:cs typeface="Calibri" panose="020F0502020204030204" pitchFamily="34" charset="0"/>
+              </a:rPr>
+              <a:t>))</a:t>
+            </a:r>
+            <a:endParaRPr lang="en-US" altLang="en-US" sz="3200" dirty="0">
+              <a:solidFill>
+                <a:srgbClr val="0070C0"/>
+              </a:solidFill>
+              <a:latin typeface="Calibri" panose="020F0502020204030204" pitchFamily="34" charset="0"/>
+              <a:cs typeface="Calibri" panose="020F0502020204030204" pitchFamily="34" charset="0"/>
+            </a:endParaRPr>
+          </a:p>
+        </p:txBody>
+      </p:sp>
     </p:spTree>
     <p:extLst>
       <p:ext uri="{BB962C8B-B14F-4D97-AF65-F5344CB8AC3E}">
@@ -5985,7 +6346,7 @@
         <p:spPr>
           <a:xfrm>
             <a:off x="1610959" y="907617"/>
-            <a:ext cx="0" cy="2064183"/>
+            <a:ext cx="0" cy="2140383"/>
           </a:xfrm>
           <a:prstGeom prst="line">
             <a:avLst/>
@@ -6021,8 +6382,8 @@
         </p:nvSpPr>
         <p:spPr>
           <a:xfrm>
-            <a:off x="1538951" y="1258312"/>
-            <a:ext cx="148978" cy="1411540"/>
+            <a:off x="1525118" y="1258312"/>
+            <a:ext cx="162811" cy="1637288"/>
           </a:xfrm>
           <a:prstGeom prst="rect">
             <a:avLst/>
@@ -6873,7 +7234,7 @@
         </p:nvCxnSpPr>
         <p:spPr>
           <a:xfrm>
-            <a:off x="152400" y="2648316"/>
+            <a:off x="138567" y="2895600"/>
             <a:ext cx="1386551" cy="0"/>
           </a:xfrm>
           <a:prstGeom prst="straightConnector1">
@@ -6903,6 +7264,367 @@
           </a:fontRef>
         </p:style>
       </p:cxnSp>
+      <p:sp>
+        <p:nvSpPr>
+          <p:cNvPr id="24" name="Rectangle 62">
+            <a:extLst>
+              <a:ext uri="{FF2B5EF4-FFF2-40B4-BE49-F238E27FC236}">
+                <a16:creationId xmlns:a16="http://schemas.microsoft.com/office/drawing/2014/main" id="{7B4FF022-9FAF-438B-B21E-23ED2AB5D541}"/>
+              </a:ext>
+            </a:extLst>
+          </p:cNvPr>
+          <p:cNvSpPr/>
+          <p:nvPr/>
+        </p:nvSpPr>
+        <p:spPr>
+          <a:xfrm>
+            <a:off x="8156352" y="422906"/>
+            <a:ext cx="1670495" cy="461538"/>
+          </a:xfrm>
+          <a:prstGeom prst="rect">
+            <a:avLst/>
+          </a:prstGeom>
+          <a:solidFill>
+            <a:schemeClr val="accent1">
+              <a:lumMod val="60000"/>
+              <a:lumOff val="40000"/>
+            </a:schemeClr>
+          </a:solidFill>
+          <a:ln w="19050">
+            <a:noFill/>
+          </a:ln>
+          <a:effectLst/>
+        </p:spPr>
+        <p:style>
+          <a:lnRef idx="1">
+            <a:schemeClr val="accent2"/>
+          </a:lnRef>
+          <a:fillRef idx="2">
+            <a:schemeClr val="accent2"/>
+          </a:fillRef>
+          <a:effectRef idx="1">
+            <a:schemeClr val="accent2"/>
+          </a:effectRef>
+          <a:fontRef idx="minor">
+            <a:schemeClr val="dk1"/>
+          </a:fontRef>
+        </p:style>
+        <p:txBody>
+          <a:bodyPr rtlCol="0" anchor="ctr"/>
+          <a:lstStyle/>
+          <a:p>
+            <a:pPr algn="ctr"/>
+            <a:r>
+              <a:rPr lang="en-US" sz="1600" dirty="0">
+                <a:solidFill>
+                  <a:schemeClr val="bg1"/>
+                </a:solidFill>
+              </a:rPr>
+              <a:t>:</a:t>
+            </a:r>
+            <a:r>
+              <a:rPr lang="en-US" sz="1600" dirty="0" err="1">
+                <a:solidFill>
+                  <a:schemeClr val="bg1"/>
+                </a:solidFill>
+              </a:rPr>
+              <a:t>EventsCenter</a:t>
+            </a:r>
+            <a:endParaRPr lang="en-SG" sz="1600" dirty="0">
+              <a:solidFill>
+                <a:schemeClr val="bg1"/>
+              </a:solidFill>
+            </a:endParaRPr>
+          </a:p>
+        </p:txBody>
+      </p:sp>
+      <p:cxnSp>
+        <p:nvCxnSpPr>
+          <p:cNvPr id="25" name="Straight Connector 24">
+            <a:extLst>
+              <a:ext uri="{FF2B5EF4-FFF2-40B4-BE49-F238E27FC236}">
+                <a16:creationId xmlns:a16="http://schemas.microsoft.com/office/drawing/2014/main" id="{A3383031-6209-4102-AECD-5B254E462597}"/>
+              </a:ext>
+            </a:extLst>
+          </p:cNvPr>
+          <p:cNvCxnSpPr>
+            <a:cxnSpLocks/>
+          </p:cNvCxnSpPr>
+          <p:nvPr/>
+        </p:nvCxnSpPr>
+        <p:spPr>
+          <a:xfrm>
+            <a:off x="8914633" y="866210"/>
+            <a:ext cx="8901" cy="2334190"/>
+          </a:xfrm>
+          <a:prstGeom prst="line">
+            <a:avLst/>
+          </a:prstGeom>
+          <a:ln w="19050">
+            <a:solidFill>
+              <a:schemeClr val="tx2">
+                <a:lumMod val="60000"/>
+                <a:lumOff val="40000"/>
+              </a:schemeClr>
+            </a:solidFill>
+            <a:prstDash val="sysDash"/>
+          </a:ln>
+          <a:effectLst/>
+        </p:spPr>
+        <p:style>
+          <a:lnRef idx="1">
+            <a:schemeClr val="accent1"/>
+          </a:lnRef>
+          <a:fillRef idx="2">
+            <a:schemeClr val="accent1"/>
+          </a:fillRef>
+          <a:effectRef idx="1">
+            <a:schemeClr val="accent1"/>
+          </a:effectRef>
+          <a:fontRef idx="minor">
+            <a:schemeClr val="dk1"/>
+          </a:fontRef>
+        </p:style>
+      </p:cxnSp>
+      <p:sp>
+        <p:nvSpPr>
+          <p:cNvPr id="27" name="Rectangle 26">
+            <a:extLst>
+              <a:ext uri="{FF2B5EF4-FFF2-40B4-BE49-F238E27FC236}">
+                <a16:creationId xmlns:a16="http://schemas.microsoft.com/office/drawing/2014/main" id="{17D582C9-3532-4406-8D36-7DFB3B633846}"/>
+              </a:ext>
+            </a:extLst>
+          </p:cNvPr>
+          <p:cNvSpPr/>
+          <p:nvPr/>
+        </p:nvSpPr>
+        <p:spPr>
+          <a:xfrm>
+            <a:off x="8826443" y="2499808"/>
+            <a:ext cx="166778" cy="285436"/>
+          </a:xfrm>
+          <a:prstGeom prst="rect">
+            <a:avLst/>
+          </a:prstGeom>
+          <a:solidFill>
+            <a:schemeClr val="accent1">
+              <a:lumMod val="60000"/>
+              <a:lumOff val="40000"/>
+            </a:schemeClr>
+          </a:solidFill>
+          <a:ln>
+            <a:noFill/>
+          </a:ln>
+          <a:effectLst/>
+        </p:spPr>
+        <p:style>
+          <a:lnRef idx="1">
+            <a:schemeClr val="accent3"/>
+          </a:lnRef>
+          <a:fillRef idx="2">
+            <a:schemeClr val="accent3"/>
+          </a:fillRef>
+          <a:effectRef idx="1">
+            <a:schemeClr val="accent3"/>
+          </a:effectRef>
+          <a:fontRef idx="minor">
+            <a:schemeClr val="dk1"/>
+          </a:fontRef>
+        </p:style>
+        <p:txBody>
+          <a:bodyPr rtlCol="0" anchor="ctr"/>
+          <a:lstStyle/>
+          <a:p>
+            <a:pPr algn="ctr"/>
+            <a:endParaRPr lang="en-SG" sz="1400"/>
+          </a:p>
+        </p:txBody>
+      </p:sp>
+      <p:cxnSp>
+        <p:nvCxnSpPr>
+          <p:cNvPr id="28" name="Straight Arrow Connector 27">
+            <a:extLst>
+              <a:ext uri="{FF2B5EF4-FFF2-40B4-BE49-F238E27FC236}">
+                <a16:creationId xmlns:a16="http://schemas.microsoft.com/office/drawing/2014/main" id="{7F759CEF-2836-4D0A-9223-31CF81889096}"/>
+              </a:ext>
+            </a:extLst>
+          </p:cNvPr>
+          <p:cNvCxnSpPr>
+            <a:cxnSpLocks/>
+          </p:cNvCxnSpPr>
+          <p:nvPr/>
+        </p:nvCxnSpPr>
+        <p:spPr>
+          <a:xfrm>
+            <a:off x="1708245" y="2527575"/>
+            <a:ext cx="7128134" cy="0"/>
+          </a:xfrm>
+          <a:prstGeom prst="straightConnector1">
+            <a:avLst/>
+          </a:prstGeom>
+          <a:ln w="19050">
+            <a:solidFill>
+              <a:srgbClr val="0070C0"/>
+            </a:solidFill>
+            <a:tailEnd type="arrow"/>
+          </a:ln>
+        </p:spPr>
+        <p:style>
+          <a:lnRef idx="1">
+            <a:schemeClr val="accent1"/>
+          </a:lnRef>
+          <a:fillRef idx="0">
+            <a:schemeClr val="accent1"/>
+          </a:fillRef>
+          <a:effectRef idx="0">
+            <a:schemeClr val="accent1"/>
+          </a:effectRef>
+          <a:fontRef idx="minor">
+            <a:schemeClr val="tx1"/>
+          </a:fontRef>
+        </p:style>
+      </p:cxnSp>
+      <p:cxnSp>
+        <p:nvCxnSpPr>
+          <p:cNvPr id="29" name="Straight Arrow Connector 28">
+            <a:extLst>
+              <a:ext uri="{FF2B5EF4-FFF2-40B4-BE49-F238E27FC236}">
+                <a16:creationId xmlns:a16="http://schemas.microsoft.com/office/drawing/2014/main" id="{941F252B-138D-4CC8-8E0C-54D3227EAC06}"/>
+              </a:ext>
+            </a:extLst>
+          </p:cNvPr>
+          <p:cNvCxnSpPr>
+            <a:cxnSpLocks/>
+          </p:cNvCxnSpPr>
+          <p:nvPr/>
+        </p:nvCxnSpPr>
+        <p:spPr>
+          <a:xfrm>
+            <a:off x="1708245" y="2801018"/>
+            <a:ext cx="7145881" cy="0"/>
+          </a:xfrm>
+          <a:prstGeom prst="straightConnector1">
+            <a:avLst/>
+          </a:prstGeom>
+          <a:ln w="19050">
+            <a:solidFill>
+              <a:srgbClr val="0070C0"/>
+            </a:solidFill>
+            <a:prstDash val="sysDash"/>
+            <a:headEnd type="arrow" w="med" len="med"/>
+            <a:tailEnd type="none" w="med" len="med"/>
+          </a:ln>
+        </p:spPr>
+        <p:style>
+          <a:lnRef idx="1">
+            <a:schemeClr val="accent1"/>
+          </a:lnRef>
+          <a:fillRef idx="0">
+            <a:schemeClr val="accent1"/>
+          </a:fillRef>
+          <a:effectRef idx="0">
+            <a:schemeClr val="accent1"/>
+          </a:effectRef>
+          <a:fontRef idx="minor">
+            <a:schemeClr val="tx1"/>
+          </a:fontRef>
+        </p:style>
+      </p:cxnSp>
+      <p:sp>
+        <p:nvSpPr>
+          <p:cNvPr id="30" name="Rectangle 29">
+            <a:extLst>
+              <a:ext uri="{FF2B5EF4-FFF2-40B4-BE49-F238E27FC236}">
+                <a16:creationId xmlns:a16="http://schemas.microsoft.com/office/drawing/2014/main" id="{25279659-E028-4782-B303-04AFC8DB6B7F}"/>
+              </a:ext>
+            </a:extLst>
+          </p:cNvPr>
+          <p:cNvSpPr/>
+          <p:nvPr/>
+        </p:nvSpPr>
+        <p:spPr>
+          <a:xfrm>
+            <a:off x="6869768" y="2203521"/>
+            <a:ext cx="4572000" cy="276999"/>
+          </a:xfrm>
+          <a:prstGeom prst="rect">
+            <a:avLst/>
+          </a:prstGeom>
+        </p:spPr>
+        <p:txBody>
+          <a:bodyPr>
+            <a:spAutoFit/>
+          </a:bodyPr>
+          <a:lstStyle/>
+          <a:p>
+            <a:pPr lvl="0" eaLnBrk="0" fontAlgn="base" hangingPunct="0">
+              <a:spcBef>
+                <a:spcPct val="0"/>
+              </a:spcBef>
+              <a:spcAft>
+                <a:spcPct val="0"/>
+              </a:spcAft>
+            </a:pPr>
+            <a:r>
+              <a:rPr lang="en-US" altLang="en-US" sz="1200" dirty="0">
+                <a:solidFill>
+                  <a:srgbClr val="0070C0"/>
+                </a:solidFill>
+                <a:latin typeface="Calibri" panose="020F0502020204030204" pitchFamily="34" charset="0"/>
+                <a:cs typeface="Calibri" panose="020F0502020204030204" pitchFamily="34" charset="0"/>
+              </a:rPr>
+              <a:t>raise(new </a:t>
+            </a:r>
+            <a:r>
+              <a:rPr lang="en-US" altLang="en-US" sz="1200" dirty="0" err="1">
+                <a:solidFill>
+                  <a:srgbClr val="0070C0"/>
+                </a:solidFill>
+                <a:latin typeface="Calibri" panose="020F0502020204030204" pitchFamily="34" charset="0"/>
+                <a:cs typeface="Calibri" panose="020F0502020204030204" pitchFamily="34" charset="0"/>
+              </a:rPr>
+              <a:t>InvestigapptorChangedEvent</a:t>
+            </a:r>
+            <a:r>
+              <a:rPr lang="en-US" altLang="en-US" sz="1200" dirty="0">
+                <a:solidFill>
+                  <a:srgbClr val="0070C0"/>
+                </a:solidFill>
+                <a:latin typeface="Calibri" panose="020F0502020204030204" pitchFamily="34" charset="0"/>
+                <a:cs typeface="Calibri" panose="020F0502020204030204" pitchFamily="34" charset="0"/>
+              </a:rPr>
+              <a:t>(</a:t>
+            </a:r>
+            <a:r>
+              <a:rPr lang="en-US" altLang="en-US" sz="1200" dirty="0" err="1">
+                <a:solidFill>
+                  <a:srgbClr val="0070C0"/>
+                </a:solidFill>
+                <a:latin typeface="Calibri" panose="020F0502020204030204" pitchFamily="34" charset="0"/>
+                <a:cs typeface="Calibri" panose="020F0502020204030204" pitchFamily="34" charset="0"/>
+              </a:rPr>
+              <a:t>i</a:t>
+            </a:r>
+            <a:r>
+              <a:rPr lang="en-US" altLang="en-US" sz="1200" dirty="0">
+                <a:solidFill>
+                  <a:srgbClr val="0070C0"/>
+                </a:solidFill>
+                <a:latin typeface="Calibri" panose="020F0502020204030204" pitchFamily="34" charset="0"/>
+                <a:cs typeface="Calibri" panose="020F0502020204030204" pitchFamily="34" charset="0"/>
+              </a:rPr>
+              <a:t>))</a:t>
+            </a:r>
+            <a:endParaRPr lang="en-US" altLang="en-US" sz="3200" dirty="0">
+              <a:solidFill>
+                <a:srgbClr val="0070C0"/>
+              </a:solidFill>
+              <a:latin typeface="Calibri" panose="020F0502020204030204" pitchFamily="34" charset="0"/>
+              <a:cs typeface="Calibri" panose="020F0502020204030204" pitchFamily="34" charset="0"/>
+            </a:endParaRPr>
+          </a:p>
+        </p:txBody>
+      </p:sp>
     </p:spTree>
     <p:extLst>
       <p:ext uri="{BB962C8B-B14F-4D97-AF65-F5344CB8AC3E}">

</xml_diff>